<commit_message>
Tablero de control v1.2 actualizado
</commit_message>
<xml_diff>
--- a/trunk/docs/Entregables/Tablero de control/GRUPO 5508 - SAFE - Tablero de control integral - UTN - v1.2.pptx
+++ b/trunk/docs/Entregables/Tablero de control/GRUPO 5508 - SAFE - Tablero de control integral - UTN - v1.2.pptx
@@ -108,7 +108,7 @@
   </p:defaultTextStyle>
   <p:extLst>
     <p:ext uri="{EFAFB233-063F-42B5-8137-9DF3F51BA10A}">
-      <p15:sldGuideLst xmlns:p15="http://schemas.microsoft.com/office/powerpoint/2012/main" xmlns="">
+      <p15:sldGuideLst xmlns="" xmlns:p15="http://schemas.microsoft.com/office/powerpoint/2012/main">
         <p15:guide id="1" orient="horz" pos="2160">
           <p15:clr>
             <a:srgbClr val="A4A3A4"/>
@@ -306,7 +306,7 @@
           <a:p>
             <a:fld id="{8A2493BC-3794-4994-AF1C-9EDE0D76EB28}" type="datetimeFigureOut">
               <a:rPr lang="en-US" smtClean="0"/>
-              <a:t>6/26/2016</a:t>
+              <a:t>6/27/2016</a:t>
             </a:fld>
             <a:endParaRPr lang="en-US"/>
           </a:p>
@@ -476,7 +476,7 @@
           <a:p>
             <a:fld id="{8A2493BC-3794-4994-AF1C-9EDE0D76EB28}" type="datetimeFigureOut">
               <a:rPr lang="en-US" smtClean="0"/>
-              <a:t>6/26/2016</a:t>
+              <a:t>6/27/2016</a:t>
             </a:fld>
             <a:endParaRPr lang="en-US"/>
           </a:p>
@@ -656,7 +656,7 @@
           <a:p>
             <a:fld id="{8A2493BC-3794-4994-AF1C-9EDE0D76EB28}" type="datetimeFigureOut">
               <a:rPr lang="en-US" smtClean="0"/>
-              <a:t>6/26/2016</a:t>
+              <a:t>6/27/2016</a:t>
             </a:fld>
             <a:endParaRPr lang="en-US"/>
           </a:p>
@@ -826,7 +826,7 @@
           <a:p>
             <a:fld id="{8A2493BC-3794-4994-AF1C-9EDE0D76EB28}" type="datetimeFigureOut">
               <a:rPr lang="en-US" smtClean="0"/>
-              <a:t>6/26/2016</a:t>
+              <a:t>6/27/2016</a:t>
             </a:fld>
             <a:endParaRPr lang="en-US"/>
           </a:p>
@@ -1072,7 +1072,7 @@
           <a:p>
             <a:fld id="{8A2493BC-3794-4994-AF1C-9EDE0D76EB28}" type="datetimeFigureOut">
               <a:rPr lang="en-US" smtClean="0"/>
-              <a:t>6/26/2016</a:t>
+              <a:t>6/27/2016</a:t>
             </a:fld>
             <a:endParaRPr lang="en-US"/>
           </a:p>
@@ -1360,7 +1360,7 @@
           <a:p>
             <a:fld id="{8A2493BC-3794-4994-AF1C-9EDE0D76EB28}" type="datetimeFigureOut">
               <a:rPr lang="en-US" smtClean="0"/>
-              <a:t>6/26/2016</a:t>
+              <a:t>6/27/2016</a:t>
             </a:fld>
             <a:endParaRPr lang="en-US"/>
           </a:p>
@@ -1782,7 +1782,7 @@
           <a:p>
             <a:fld id="{8A2493BC-3794-4994-AF1C-9EDE0D76EB28}" type="datetimeFigureOut">
               <a:rPr lang="en-US" smtClean="0"/>
-              <a:t>6/26/2016</a:t>
+              <a:t>6/27/2016</a:t>
             </a:fld>
             <a:endParaRPr lang="en-US"/>
           </a:p>
@@ -1900,7 +1900,7 @@
           <a:p>
             <a:fld id="{8A2493BC-3794-4994-AF1C-9EDE0D76EB28}" type="datetimeFigureOut">
               <a:rPr lang="en-US" smtClean="0"/>
-              <a:t>6/26/2016</a:t>
+              <a:t>6/27/2016</a:t>
             </a:fld>
             <a:endParaRPr lang="en-US"/>
           </a:p>
@@ -1995,7 +1995,7 @@
           <a:p>
             <a:fld id="{8A2493BC-3794-4994-AF1C-9EDE0D76EB28}" type="datetimeFigureOut">
               <a:rPr lang="en-US" smtClean="0"/>
-              <a:t>6/26/2016</a:t>
+              <a:t>6/27/2016</a:t>
             </a:fld>
             <a:endParaRPr lang="en-US"/>
           </a:p>
@@ -2272,7 +2272,7 @@
           <a:p>
             <a:fld id="{8A2493BC-3794-4994-AF1C-9EDE0D76EB28}" type="datetimeFigureOut">
               <a:rPr lang="en-US" smtClean="0"/>
-              <a:t>6/26/2016</a:t>
+              <a:t>6/27/2016</a:t>
             </a:fld>
             <a:endParaRPr lang="en-US"/>
           </a:p>
@@ -2525,7 +2525,7 @@
           <a:p>
             <a:fld id="{8A2493BC-3794-4994-AF1C-9EDE0D76EB28}" type="datetimeFigureOut">
               <a:rPr lang="en-US" smtClean="0"/>
-              <a:t>6/26/2016</a:t>
+              <a:t>6/27/2016</a:t>
             </a:fld>
             <a:endParaRPr lang="en-US"/>
           </a:p>
@@ -2738,7 +2738,7 @@
           <a:p>
             <a:fld id="{8A2493BC-3794-4994-AF1C-9EDE0D76EB28}" type="datetimeFigureOut">
               <a:rPr lang="en-US" smtClean="0"/>
-              <a:t>6/26/2016</a:t>
+              <a:t>6/27/2016</a:t>
             </a:fld>
             <a:endParaRPr lang="en-US"/>
           </a:p>
@@ -3153,17 +3153,8 @@
           <a:p>
             <a:r>
               <a:rPr lang="es-AR" dirty="0" smtClean="0"/>
-              <a:t>Informe de Seguimiento del </a:t>
-            </a:r>
-            <a:r>
-              <a:rPr lang="es-AR" dirty="0" smtClean="0"/>
-              <a:t>01</a:t>
-            </a:r>
-            <a:r>
-              <a:rPr lang="es-AR" dirty="0" smtClean="0"/>
-              <a:t>/07/2016</a:t>
-            </a:r>
-            <a:endParaRPr lang="es-AR" dirty="0" smtClean="0"/>
+              <a:t>Informe de Seguimiento del 01/07/2016</a:t>
+            </a:r>
           </a:p>
           <a:p>
             <a:endParaRPr lang="en-US" dirty="0"/>
@@ -3252,14 +3243,14 @@
           <p:nvPr>
             <p:extLst>
               <p:ext uri="{D42A27DB-BD31-4B8C-83A1-F6EECF244321}">
-                <p14:modId xmlns:p14="http://schemas.microsoft.com/office/powerpoint/2010/main" val="2527899704"/>
+                <p14:modId xmlns:p14="http://schemas.microsoft.com/office/powerpoint/2010/main" val="373826247"/>
               </p:ext>
             </p:extLst>
           </p:nvPr>
         </p:nvGraphicFramePr>
         <p:xfrm>
           <a:off x="2411760" y="1654336"/>
-          <a:ext cx="6048672" cy="424044"/>
+          <a:ext cx="6048672" cy="744084"/>
         </p:xfrm>
         <a:graphic>
           <a:graphicData uri="http://schemas.openxmlformats.org/drawingml/2006/table">
@@ -3271,35 +3262,35 @@
                 <a:gridCol w="1221366">
                   <a:extLst>
                     <a:ext uri="{9D8B030D-6E8A-4147-A177-3AD203B41FA5}">
-                      <a16:colId xmlns:a16="http://schemas.microsoft.com/office/drawing/2014/main" xmlns="" val="20000"/>
+                      <a16:colId xmlns="" xmlns:a16="http://schemas.microsoft.com/office/drawing/2014/main" val="20000"/>
                     </a:ext>
                   </a:extLst>
                 </a:gridCol>
                 <a:gridCol w="1279527">
                   <a:extLst>
                     <a:ext uri="{9D8B030D-6E8A-4147-A177-3AD203B41FA5}">
-                      <a16:colId xmlns:a16="http://schemas.microsoft.com/office/drawing/2014/main" xmlns="" val="20001"/>
+                      <a16:colId xmlns="" xmlns:a16="http://schemas.microsoft.com/office/drawing/2014/main" val="20001"/>
                     </a:ext>
                   </a:extLst>
                 </a:gridCol>
                 <a:gridCol w="1279527">
                   <a:extLst>
                     <a:ext uri="{9D8B030D-6E8A-4147-A177-3AD203B41FA5}">
-                      <a16:colId xmlns:a16="http://schemas.microsoft.com/office/drawing/2014/main" xmlns="" val="20002"/>
+                      <a16:colId xmlns="" xmlns:a16="http://schemas.microsoft.com/office/drawing/2014/main" val="20002"/>
                     </a:ext>
                   </a:extLst>
                 </a:gridCol>
                 <a:gridCol w="1046886">
                   <a:extLst>
                     <a:ext uri="{9D8B030D-6E8A-4147-A177-3AD203B41FA5}">
-                      <a16:colId xmlns:a16="http://schemas.microsoft.com/office/drawing/2014/main" xmlns="" val="20003"/>
+                      <a16:colId xmlns="" xmlns:a16="http://schemas.microsoft.com/office/drawing/2014/main" val="20003"/>
                     </a:ext>
                   </a:extLst>
                 </a:gridCol>
                 <a:gridCol w="1221366">
                   <a:extLst>
                     <a:ext uri="{9D8B030D-6E8A-4147-A177-3AD203B41FA5}">
-                      <a16:colId xmlns:a16="http://schemas.microsoft.com/office/drawing/2014/main" xmlns="" val="20004"/>
+                      <a16:colId xmlns="" xmlns:a16="http://schemas.microsoft.com/office/drawing/2014/main" val="20004"/>
                     </a:ext>
                   </a:extLst>
                 </a:gridCol>
@@ -3524,7 +3515,7 @@
                     <a:bodyPr/>
                     <a:lstStyle/>
                     <a:p>
-                      <a:pPr marL="0" marR="0" lvl="0" indent="0" algn="ctr" defTabSz="914400" rtl="0" eaLnBrk="1" fontAlgn="base" latinLnBrk="0" hangingPunct="1">
+                      <a:pPr marL="228600" marR="0" lvl="0" indent="-228600" algn="ctr" defTabSz="914400" rtl="0" eaLnBrk="1" fontAlgn="base" latinLnBrk="0" hangingPunct="1">
                         <a:lnSpc>
                           <a:spcPct val="100000"/>
                         </a:lnSpc>
@@ -3537,9 +3528,57 @@
                         <a:buClrTx/>
                         <a:buSzTx/>
                         <a:buFont typeface="Arial" pitchFamily="34" charset="0"/>
-                        <a:buNone/>
+                        <a:buAutoNum type="arabicPeriod"/>
                         <a:tabLst/>
                       </a:pPr>
+                      <a:r>
+                        <a:rPr kumimoji="0" lang="it-IT" sz="1050" b="0" i="0" u="none" strike="noStrike" cap="none" normalizeH="0" baseline="0" dirty="0" smtClean="0">
+                          <a:ln>
+                            <a:noFill/>
+                          </a:ln>
+                          <a:solidFill>
+                            <a:srgbClr val="1F497D"/>
+                          </a:solidFill>
+                          <a:effectLst/>
+                          <a:latin typeface="TheSansCorrespondence" pitchFamily="34" charset="0"/>
+                          <a:ea typeface="ＭＳ Ｐゴシック"/>
+                          <a:cs typeface="ＭＳ Ｐゴシック"/>
+                        </a:rPr>
+                        <a:t>Inicio: 72%</a:t>
+                      </a:r>
+                    </a:p>
+                    <a:p>
+                      <a:pPr marL="228600" marR="0" lvl="0" indent="-228600" algn="ctr" defTabSz="914400" rtl="0" eaLnBrk="1" fontAlgn="base" latinLnBrk="0" hangingPunct="1">
+                        <a:lnSpc>
+                          <a:spcPct val="100000"/>
+                        </a:lnSpc>
+                        <a:spcBef>
+                          <a:spcPct val="20000"/>
+                        </a:spcBef>
+                        <a:spcAft>
+                          <a:spcPct val="0"/>
+                        </a:spcAft>
+                        <a:buClrTx/>
+                        <a:buSzTx/>
+                        <a:buFont typeface="Arial" pitchFamily="34" charset="0"/>
+                        <a:buAutoNum type="arabicPeriod"/>
+                        <a:tabLst/>
+                      </a:pPr>
+                      <a:r>
+                        <a:rPr kumimoji="0" lang="it-IT" sz="1050" b="0" i="0" u="none" strike="noStrike" cap="none" normalizeH="0" baseline="0" dirty="0" smtClean="0">
+                          <a:ln>
+                            <a:noFill/>
+                          </a:ln>
+                          <a:solidFill>
+                            <a:srgbClr val="1F497D"/>
+                          </a:solidFill>
+                          <a:effectLst/>
+                          <a:latin typeface="TheSansCorrespondence" pitchFamily="34" charset="0"/>
+                          <a:ea typeface="ＭＳ Ｐゴシック"/>
+                          <a:cs typeface="ＭＳ Ｐゴシック"/>
+                        </a:rPr>
+                        <a:t>Relevamiento: 47%</a:t>
+                      </a:r>
                       <a:endParaRPr kumimoji="0" lang="it-IT" sz="1050" b="0" i="0" u="none" strike="noStrike" cap="none" normalizeH="0" baseline="0" dirty="0" smtClean="0">
                         <a:ln>
                           <a:noFill/>
@@ -3605,6 +3644,54 @@
                         <a:buNone/>
                         <a:tabLst/>
                       </a:pPr>
+                      <a:r>
+                        <a:rPr kumimoji="0" lang="it-IT" sz="1050" b="0" i="0" u="none" strike="noStrike" cap="none" normalizeH="0" baseline="0" dirty="0" smtClean="0">
+                          <a:ln>
+                            <a:noFill/>
+                          </a:ln>
+                          <a:solidFill>
+                            <a:srgbClr val="1F497D"/>
+                          </a:solidFill>
+                          <a:effectLst/>
+                          <a:latin typeface="TheSansCorrespondence" pitchFamily="34" charset="0"/>
+                          <a:ea typeface="ＭＳ Ｐゴシック"/>
+                          <a:cs typeface="ＭＳ Ｐゴシック"/>
+                        </a:rPr>
+                        <a:t>Analisis, Desarrollo y Test</a:t>
+                      </a:r>
+                    </a:p>
+                    <a:p>
+                      <a:pPr marL="0" marR="0" lvl="0" indent="0" algn="ctr" defTabSz="914400" rtl="0" eaLnBrk="1" fontAlgn="base" latinLnBrk="0" hangingPunct="1">
+                        <a:lnSpc>
+                          <a:spcPct val="100000"/>
+                        </a:lnSpc>
+                        <a:spcBef>
+                          <a:spcPct val="20000"/>
+                        </a:spcBef>
+                        <a:spcAft>
+                          <a:spcPct val="0"/>
+                        </a:spcAft>
+                        <a:buClrTx/>
+                        <a:buSzTx/>
+                        <a:buFont typeface="Arial" pitchFamily="34" charset="0"/>
+                        <a:buNone/>
+                        <a:tabLst/>
+                      </a:pPr>
+                      <a:r>
+                        <a:rPr kumimoji="0" lang="it-IT" sz="1050" b="0" i="0" u="none" strike="noStrike" cap="none" normalizeH="0" baseline="0" dirty="0" smtClean="0">
+                          <a:ln>
+                            <a:noFill/>
+                          </a:ln>
+                          <a:solidFill>
+                            <a:srgbClr val="1F497D"/>
+                          </a:solidFill>
+                          <a:effectLst/>
+                          <a:latin typeface="TheSansCorrespondence" pitchFamily="34" charset="0"/>
+                          <a:ea typeface="ＭＳ Ｐゴシック"/>
+                          <a:cs typeface="ＭＳ Ｐゴシック"/>
+                        </a:rPr>
+                        <a:t>Incremento 1: 30/08/2016</a:t>
+                      </a:r>
                       <a:endParaRPr kumimoji="0" lang="it-IT" sz="1050" b="0" i="0" u="none" strike="noStrike" cap="none" normalizeH="0" baseline="0" dirty="0" smtClean="0">
                         <a:ln>
                           <a:noFill/>
@@ -3679,35 +3766,8 @@
                           <a:ea typeface="ＭＳ Ｐゴシック"/>
                           <a:cs typeface="ＭＳ Ｐゴシック"/>
                         </a:rPr>
-                        <a:t>Cierre </a:t>
+                        <a:t>Cierre 18-Nov</a:t>
                       </a:r>
-                      <a:r>
-                        <a:rPr kumimoji="0" lang="it-IT" sz="1050" b="0" i="0" u="none" strike="noStrike" cap="none" normalizeH="0" baseline="0" dirty="0" smtClean="0">
-                          <a:ln>
-                            <a:noFill/>
-                          </a:ln>
-                          <a:solidFill>
-                            <a:srgbClr val="1F497D"/>
-                          </a:solidFill>
-                          <a:effectLst/>
-                          <a:latin typeface="TheSansCorrespondence" pitchFamily="34" charset="0"/>
-                          <a:ea typeface="ＭＳ Ｐゴシック"/>
-                          <a:cs typeface="ＭＳ Ｐゴシック"/>
-                        </a:rPr>
-                        <a:t>18-Nov</a:t>
-                      </a:r>
-                      <a:endParaRPr kumimoji="0" lang="it-IT" sz="1050" b="0" i="0" u="none" strike="noStrike" cap="none" normalizeH="0" baseline="0" dirty="0" smtClean="0">
-                        <a:ln>
-                          <a:noFill/>
-                        </a:ln>
-                        <a:solidFill>
-                          <a:srgbClr val="1F497D"/>
-                        </a:solidFill>
-                        <a:effectLst/>
-                        <a:latin typeface="TheSansCorrespondence" pitchFamily="34" charset="0"/>
-                        <a:ea typeface="ＭＳ Ｐゴシック"/>
-                        <a:cs typeface="ＭＳ Ｐゴシック"/>
-                      </a:endParaRPr>
                     </a:p>
                     <a:p>
                       <a:pPr marL="0" marR="0" lvl="0" indent="0" algn="ctr" defTabSz="914400" rtl="0" eaLnBrk="1" fontAlgn="base" latinLnBrk="0" hangingPunct="1">
@@ -3739,7 +3799,7 @@
                           <a:ea typeface="ＭＳ Ｐゴシック"/>
                           <a:cs typeface="ＭＳ Ｐゴシック"/>
                         </a:rPr>
-                        <a:t>38%</a:t>
+                        <a:t>40%</a:t>
                       </a:r>
                       <a:endParaRPr kumimoji="0" lang="it-IT" sz="1050" b="0" i="0" u="none" strike="noStrike" cap="none" normalizeH="0" baseline="0" dirty="0" smtClean="0">
                         <a:ln>
@@ -3783,7 +3843,7 @@
                 </a:tc>
                 <a:extLst>
                   <a:ext uri="{0D108BD9-81ED-4DB2-BD59-A6C34878D82A}">
-                    <a16:rowId xmlns:a16="http://schemas.microsoft.com/office/drawing/2014/main" xmlns="" val="10000"/>
+                    <a16:rowId xmlns="" xmlns:a16="http://schemas.microsoft.com/office/drawing/2014/main" val="10000"/>
                   </a:ext>
                 </a:extLst>
               </a:tr>
@@ -3813,35 +3873,35 @@
                 <a:gridCol w="1287790">
                   <a:extLst>
                     <a:ext uri="{9D8B030D-6E8A-4147-A177-3AD203B41FA5}">
-                      <a16:colId xmlns:a16="http://schemas.microsoft.com/office/drawing/2014/main" xmlns="" val="20000"/>
+                      <a16:colId xmlns="" xmlns:a16="http://schemas.microsoft.com/office/drawing/2014/main" val="20000"/>
                     </a:ext>
                   </a:extLst>
                 </a:gridCol>
                 <a:gridCol w="1287790">
                   <a:extLst>
                     <a:ext uri="{9D8B030D-6E8A-4147-A177-3AD203B41FA5}">
-                      <a16:colId xmlns:a16="http://schemas.microsoft.com/office/drawing/2014/main" xmlns="" val="20001"/>
+                      <a16:colId xmlns="" xmlns:a16="http://schemas.microsoft.com/office/drawing/2014/main" val="20001"/>
                     </a:ext>
                   </a:extLst>
                 </a:gridCol>
                 <a:gridCol w="1229253">
                   <a:extLst>
                     <a:ext uri="{9D8B030D-6E8A-4147-A177-3AD203B41FA5}">
-                      <a16:colId xmlns:a16="http://schemas.microsoft.com/office/drawing/2014/main" xmlns="" val="20002"/>
+                      <a16:colId xmlns="" xmlns:a16="http://schemas.microsoft.com/office/drawing/2014/main" val="20002"/>
                     </a:ext>
                   </a:extLst>
                 </a:gridCol>
                 <a:gridCol w="1053619">
                   <a:extLst>
                     <a:ext uri="{9D8B030D-6E8A-4147-A177-3AD203B41FA5}">
-                      <a16:colId xmlns:a16="http://schemas.microsoft.com/office/drawing/2014/main" xmlns="" val="20003"/>
+                      <a16:colId xmlns="" xmlns:a16="http://schemas.microsoft.com/office/drawing/2014/main" val="20003"/>
                     </a:ext>
                   </a:extLst>
                 </a:gridCol>
                 <a:gridCol w="1190220">
                   <a:extLst>
                     <a:ext uri="{9D8B030D-6E8A-4147-A177-3AD203B41FA5}">
-                      <a16:colId xmlns:a16="http://schemas.microsoft.com/office/drawing/2014/main" xmlns="" val="20004"/>
+                      <a16:colId xmlns="" xmlns:a16="http://schemas.microsoft.com/office/drawing/2014/main" val="20004"/>
                     </a:ext>
                   </a:extLst>
                 </a:gridCol>
@@ -4165,7 +4225,7 @@
                 </a:tc>
                 <a:extLst>
                   <a:ext uri="{0D108BD9-81ED-4DB2-BD59-A6C34878D82A}">
-                    <a16:rowId xmlns:a16="http://schemas.microsoft.com/office/drawing/2014/main" xmlns="" val="10000"/>
+                    <a16:rowId xmlns="" xmlns:a16="http://schemas.microsoft.com/office/drawing/2014/main" val="10000"/>
                   </a:ext>
                 </a:extLst>
               </a:tr>
@@ -4229,7 +4289,7 @@
         </p:nvSpPr>
         <p:spPr bwMode="blackWhite">
           <a:xfrm>
-            <a:off x="539552" y="1628800"/>
+            <a:off x="395536" y="1772816"/>
             <a:ext cx="2088231" cy="487367"/>
           </a:xfrm>
           <a:prstGeom prst="flowChartAlternateProcess">
@@ -4283,7 +4343,7 @@
         </p:blipFill>
         <p:spPr bwMode="auto">
           <a:xfrm>
-            <a:off x="8460432" y="1630392"/>
+            <a:off x="8500243" y="1839662"/>
             <a:ext cx="273050" cy="485775"/>
           </a:xfrm>
           <a:prstGeom prst="rect">
@@ -5953,35 +6013,8 @@
                 <a:latin typeface="TheSansCorrespondence" pitchFamily="34" charset="0"/>
                 <a:ea typeface="ＭＳ Ｐゴシック"/>
               </a:rPr>
-              <a:t>Inicio: </a:t>
-            </a:r>
-            <a:r>
-              <a:rPr lang="es-AR" sz="1000" b="1" dirty="0" smtClean="0">
-                <a:solidFill>
-                  <a:srgbClr val="1F497D"/>
-                </a:solidFill>
-                <a:latin typeface="TheSansCorrespondence" pitchFamily="34" charset="0"/>
-                <a:ea typeface="ＭＳ Ｐゴシック"/>
-              </a:rPr>
-              <a:t>01</a:t>
-            </a:r>
-            <a:r>
-              <a:rPr lang="es-AR" sz="1000" b="1" dirty="0" smtClean="0">
-                <a:solidFill>
-                  <a:srgbClr val="1F497D"/>
-                </a:solidFill>
-                <a:latin typeface="TheSansCorrespondence" pitchFamily="34" charset="0"/>
-                <a:ea typeface="ＭＳ Ｐゴシック"/>
-              </a:rPr>
-              <a:t>/04/2016 </a:t>
-            </a:r>
-            <a:endParaRPr lang="es-AR" sz="1000" b="1" dirty="0" smtClean="0">
-              <a:solidFill>
-                <a:srgbClr val="1F497D"/>
-              </a:solidFill>
-              <a:latin typeface="TheSansCorrespondence" pitchFamily="34" charset="0"/>
-              <a:ea typeface="ＭＳ Ｐゴシック"/>
-            </a:endParaRPr>
+              <a:t>Inicio: 01/04/2016 </a:t>
+            </a:r>
           </a:p>
         </p:txBody>
       </p:sp>
@@ -6024,27 +6057,7 @@
                 <a:latin typeface="TheSansCorrespondence" pitchFamily="34" charset="0"/>
                 <a:ea typeface="ＭＳ Ｐゴシック"/>
               </a:rPr>
-              <a:t>Fin Estimado:  </a:t>
-            </a:r>
-            <a:r>
-              <a:rPr lang="es-AR" sz="1000" b="1" dirty="0" smtClean="0">
-                <a:solidFill>
-                  <a:srgbClr val="1F497D"/>
-                </a:solidFill>
-                <a:latin typeface="TheSansCorrespondence" pitchFamily="34" charset="0"/>
-                <a:ea typeface="ＭＳ Ｐゴシック"/>
-              </a:rPr>
-              <a:t>18</a:t>
-            </a:r>
-            <a:r>
-              <a:rPr lang="es-AR" sz="1000" b="1" dirty="0" smtClean="0">
-                <a:solidFill>
-                  <a:srgbClr val="1F497D"/>
-                </a:solidFill>
-                <a:latin typeface="TheSansCorrespondence" pitchFamily="34" charset="0"/>
-                <a:ea typeface="ＭＳ Ｐゴシック"/>
-              </a:rPr>
-              <a:t>/11/2016</a:t>
+              <a:t>Fin Estimado:  18/11/2016</a:t>
             </a:r>
             <a:endParaRPr lang="es-AR" sz="1000" b="1" dirty="0">
               <a:solidFill>
@@ -6095,8 +6108,25 @@
                 <a:latin typeface="TheSansCorrespondence" pitchFamily="34" charset="0"/>
                 <a:ea typeface="ＭＳ Ｐゴシック"/>
               </a:rPr>
-              <a:t>Esperado: 17%</a:t>
-            </a:r>
+              <a:t>Esperado: </a:t>
+            </a:r>
+            <a:r>
+              <a:rPr lang="es-AR" sz="1000" b="1" dirty="0" smtClean="0">
+                <a:solidFill>
+                  <a:srgbClr val="1F497D"/>
+                </a:solidFill>
+                <a:latin typeface="TheSansCorrespondence" pitchFamily="34" charset="0"/>
+                <a:ea typeface="ＭＳ Ｐゴシック"/>
+              </a:rPr>
+              <a:t>50%</a:t>
+            </a:r>
+            <a:endParaRPr lang="es-AR" sz="1000" b="1" dirty="0" smtClean="0">
+              <a:solidFill>
+                <a:srgbClr val="1F497D"/>
+              </a:solidFill>
+              <a:latin typeface="TheSansCorrespondence" pitchFamily="34" charset="0"/>
+              <a:ea typeface="ＭＳ Ｐゴシック"/>
+            </a:endParaRPr>
           </a:p>
         </p:txBody>
       </p:sp>
@@ -6142,6 +6172,16 @@
               <a:t>Real: </a:t>
             </a:r>
             <a:r>
+              <a:rPr lang="es-AR" sz="1000" b="1" dirty="0">
+                <a:solidFill>
+                  <a:srgbClr val="1F497D"/>
+                </a:solidFill>
+                <a:latin typeface="TheSansCorrespondence" pitchFamily="34" charset="0"/>
+                <a:ea typeface="ＭＳ Ｐゴシック"/>
+              </a:rPr>
+              <a:t>4</a:t>
+            </a:r>
+            <a:r>
               <a:rPr lang="es-AR" sz="1000" b="1" dirty="0" smtClean="0">
                 <a:solidFill>
                   <a:srgbClr val="1F497D"/>
@@ -6149,7 +6189,7 @@
                 <a:latin typeface="TheSansCorrespondence" pitchFamily="34" charset="0"/>
                 <a:ea typeface="ＭＳ Ｐゴシック"/>
               </a:rPr>
-              <a:t>38%</a:t>
+              <a:t>0%</a:t>
             </a:r>
             <a:endParaRPr lang="es-AR" sz="1000" b="1" dirty="0">
               <a:solidFill>
@@ -6423,35 +6463,7 @@
                 <a:latin typeface="Arial" panose="020B0604020202020204" pitchFamily="34" charset="0"/>
                 <a:cs typeface="Arial" panose="020B0604020202020204" pitchFamily="34" charset="0"/>
               </a:rPr>
-              <a:t>-    Aprobación de documento </a:t>
-            </a:r>
-            <a:r>
-              <a:rPr lang="es-AR" sz="1000" dirty="0" smtClean="0">
-                <a:latin typeface="Arial" panose="020B0604020202020204" pitchFamily="34" charset="0"/>
-                <a:cs typeface="Arial" panose="020B0604020202020204" pitchFamily="34" charset="0"/>
-              </a:rPr>
-              <a:t>WBS </a:t>
-            </a:r>
-            <a:r>
-              <a:rPr lang="es-AR" sz="1000" dirty="0" smtClean="0">
-                <a:latin typeface="Arial" panose="020B0604020202020204" pitchFamily="34" charset="0"/>
-                <a:cs typeface="Arial" panose="020B0604020202020204" pitchFamily="34" charset="0"/>
-              </a:rPr>
-              <a:t>(</a:t>
-            </a:r>
-            <a:r>
-              <a:rPr lang="es-AR" sz="1000" dirty="0" smtClean="0">
-                <a:latin typeface="Arial" panose="020B0604020202020204" pitchFamily="34" charset="0"/>
-                <a:cs typeface="Arial" panose="020B0604020202020204" pitchFamily="34" charset="0"/>
-              </a:rPr>
-              <a:t>27</a:t>
-            </a:r>
-            <a:r>
-              <a:rPr lang="es-AR" sz="1000" dirty="0" smtClean="0">
-                <a:latin typeface="Arial" panose="020B0604020202020204" pitchFamily="34" charset="0"/>
-                <a:cs typeface="Arial" panose="020B0604020202020204" pitchFamily="34" charset="0"/>
-              </a:rPr>
-              <a:t>-05-2016).</a:t>
+              <a:t>-    Aprobación de documento WBS (27-05-2016).</a:t>
             </a:r>
           </a:p>
           <a:p>
@@ -6542,14 +6554,7 @@
                 <a:latin typeface="Arial" panose="020B0604020202020204" pitchFamily="34" charset="0"/>
                 <a:cs typeface="Arial" panose="020B0604020202020204" pitchFamily="34" charset="0"/>
               </a:rPr>
-              <a:t>Presentado, esperando aprobación.</a:t>
-            </a:r>
-            <a:r>
-              <a:rPr lang="es-AR" sz="1000" dirty="0" smtClean="0">
-                <a:latin typeface="Arial" panose="020B0604020202020204" pitchFamily="34" charset="0"/>
-                <a:cs typeface="Arial" panose="020B0604020202020204" pitchFamily="34" charset="0"/>
-              </a:rPr>
-              <a:t> </a:t>
+              <a:t>Presentado, esperando aprobación. </a:t>
             </a:r>
           </a:p>
           <a:p>
@@ -6657,7 +6662,7 @@
         <p:spPr>
           <a:xfrm>
             <a:off x="249928" y="5468451"/>
-            <a:ext cx="5258175" cy="830997"/>
+            <a:ext cx="5258175" cy="984885"/>
           </a:xfrm>
           <a:prstGeom prst="rect">
             <a:avLst/>
@@ -6696,8 +6701,32 @@
                 <a:latin typeface="Arial" pitchFamily="34" charset="0"/>
                 <a:cs typeface="Arial" pitchFamily="34" charset="0"/>
               </a:rPr>
-              <a:t>Se acordó la tecnología a utilizar en la implementación.</a:t>
-            </a:r>
+              <a:t>Se acordó la tecnología a utilizar en la implementación</a:t>
+            </a:r>
+            <a:r>
+              <a:rPr lang="es-AR" sz="1000" dirty="0" smtClean="0">
+                <a:latin typeface="Arial" pitchFamily="34" charset="0"/>
+                <a:cs typeface="Arial" pitchFamily="34" charset="0"/>
+              </a:rPr>
+              <a:t>.</a:t>
+            </a:r>
+          </a:p>
+          <a:p>
+            <a:pPr marL="171450" indent="-171450">
+              <a:buFontTx/>
+              <a:buChar char="-"/>
+            </a:pPr>
+            <a:r>
+              <a:rPr lang="es-AR" sz="1000" dirty="0" smtClean="0">
+                <a:latin typeface="Arial" pitchFamily="34" charset="0"/>
+                <a:cs typeface="Arial" pitchFamily="34" charset="0"/>
+              </a:rPr>
+              <a:t>Se decidió lanzar el producto mediante “prueba piloto”</a:t>
+            </a:r>
+            <a:endParaRPr lang="es-AR" sz="1000" dirty="0" smtClean="0">
+              <a:latin typeface="Arial" pitchFamily="34" charset="0"/>
+              <a:cs typeface="Arial" pitchFamily="34" charset="0"/>
+            </a:endParaRPr>
           </a:p>
           <a:p>
             <a:pPr marL="171450" indent="-171450">

</xml_diff>

<commit_message>
actualizacion del tablero de control
</commit_message>
<xml_diff>
--- a/trunk/docs/Entregables/Tablero de control/GRUPO 5508 - SAFE - Tablero de control integral - UTN - v1.2.pptx
+++ b/trunk/docs/Entregables/Tablero de control/GRUPO 5508 - SAFE - Tablero de control integral - UTN - v1.2.pptx
@@ -108,7 +108,7 @@
   </p:defaultTextStyle>
   <p:extLst>
     <p:ext uri="{EFAFB233-063F-42B5-8137-9DF3F51BA10A}">
-      <p15:sldGuideLst xmlns="" xmlns:p15="http://schemas.microsoft.com/office/powerpoint/2012/main">
+      <p15:sldGuideLst xmlns:p15="http://schemas.microsoft.com/office/powerpoint/2012/main" xmlns="">
         <p15:guide id="1" orient="horz" pos="2160">
           <p15:clr>
             <a:srgbClr val="A4A3A4"/>
@@ -308,7 +308,7 @@
               <a:rPr lang="en-US" smtClean="0"/>
               <a:t>6/29/2016</a:t>
             </a:fld>
-            <a:endParaRPr lang="en-US"/>
+            <a:endParaRPr lang="en-US" dirty="0"/>
           </a:p>
         </p:txBody>
       </p:sp>
@@ -327,7 +327,7 @@
           <a:bodyPr/>
           <a:lstStyle/>
           <a:p>
-            <a:endParaRPr lang="en-US"/>
+            <a:endParaRPr lang="en-US" dirty="0"/>
           </a:p>
         </p:txBody>
       </p:sp>
@@ -350,7 +350,7 @@
               <a:rPr lang="en-US" smtClean="0"/>
               <a:t>‹#›</a:t>
             </a:fld>
-            <a:endParaRPr lang="en-US"/>
+            <a:endParaRPr lang="en-US" dirty="0"/>
           </a:p>
         </p:txBody>
       </p:sp>
@@ -478,7 +478,7 @@
               <a:rPr lang="en-US" smtClean="0"/>
               <a:t>6/29/2016</a:t>
             </a:fld>
-            <a:endParaRPr lang="en-US"/>
+            <a:endParaRPr lang="en-US" dirty="0"/>
           </a:p>
         </p:txBody>
       </p:sp>
@@ -497,7 +497,7 @@
           <a:bodyPr/>
           <a:lstStyle/>
           <a:p>
-            <a:endParaRPr lang="en-US"/>
+            <a:endParaRPr lang="en-US" dirty="0"/>
           </a:p>
         </p:txBody>
       </p:sp>
@@ -520,7 +520,7 @@
               <a:rPr lang="en-US" smtClean="0"/>
               <a:t>‹#›</a:t>
             </a:fld>
-            <a:endParaRPr lang="en-US"/>
+            <a:endParaRPr lang="en-US" dirty="0"/>
           </a:p>
         </p:txBody>
       </p:sp>
@@ -658,7 +658,7 @@
               <a:rPr lang="en-US" smtClean="0"/>
               <a:t>6/29/2016</a:t>
             </a:fld>
-            <a:endParaRPr lang="en-US"/>
+            <a:endParaRPr lang="en-US" dirty="0"/>
           </a:p>
         </p:txBody>
       </p:sp>
@@ -677,7 +677,7 @@
           <a:bodyPr/>
           <a:lstStyle/>
           <a:p>
-            <a:endParaRPr lang="en-US"/>
+            <a:endParaRPr lang="en-US" dirty="0"/>
           </a:p>
         </p:txBody>
       </p:sp>
@@ -700,7 +700,7 @@
               <a:rPr lang="en-US" smtClean="0"/>
               <a:t>‹#›</a:t>
             </a:fld>
-            <a:endParaRPr lang="en-US"/>
+            <a:endParaRPr lang="en-US" dirty="0"/>
           </a:p>
         </p:txBody>
       </p:sp>
@@ -828,7 +828,7 @@
               <a:rPr lang="en-US" smtClean="0"/>
               <a:t>6/29/2016</a:t>
             </a:fld>
-            <a:endParaRPr lang="en-US"/>
+            <a:endParaRPr lang="en-US" dirty="0"/>
           </a:p>
         </p:txBody>
       </p:sp>
@@ -847,7 +847,7 @@
           <a:bodyPr/>
           <a:lstStyle/>
           <a:p>
-            <a:endParaRPr lang="en-US"/>
+            <a:endParaRPr lang="en-US" dirty="0"/>
           </a:p>
         </p:txBody>
       </p:sp>
@@ -870,7 +870,7 @@
               <a:rPr lang="en-US" smtClean="0"/>
               <a:t>‹#›</a:t>
             </a:fld>
-            <a:endParaRPr lang="en-US"/>
+            <a:endParaRPr lang="en-US" dirty="0"/>
           </a:p>
         </p:txBody>
       </p:sp>
@@ -1074,7 +1074,7 @@
               <a:rPr lang="en-US" smtClean="0"/>
               <a:t>6/29/2016</a:t>
             </a:fld>
-            <a:endParaRPr lang="en-US"/>
+            <a:endParaRPr lang="en-US" dirty="0"/>
           </a:p>
         </p:txBody>
       </p:sp>
@@ -1093,7 +1093,7 @@
           <a:bodyPr/>
           <a:lstStyle/>
           <a:p>
-            <a:endParaRPr lang="en-US"/>
+            <a:endParaRPr lang="en-US" dirty="0"/>
           </a:p>
         </p:txBody>
       </p:sp>
@@ -1116,7 +1116,7 @@
               <a:rPr lang="en-US" smtClean="0"/>
               <a:t>‹#›</a:t>
             </a:fld>
-            <a:endParaRPr lang="en-US"/>
+            <a:endParaRPr lang="en-US" dirty="0"/>
           </a:p>
         </p:txBody>
       </p:sp>
@@ -1362,7 +1362,7 @@
               <a:rPr lang="en-US" smtClean="0"/>
               <a:t>6/29/2016</a:t>
             </a:fld>
-            <a:endParaRPr lang="en-US"/>
+            <a:endParaRPr lang="en-US" dirty="0"/>
           </a:p>
         </p:txBody>
       </p:sp>
@@ -1381,7 +1381,7 @@
           <a:bodyPr/>
           <a:lstStyle/>
           <a:p>
-            <a:endParaRPr lang="en-US"/>
+            <a:endParaRPr lang="en-US" dirty="0"/>
           </a:p>
         </p:txBody>
       </p:sp>
@@ -1404,7 +1404,7 @@
               <a:rPr lang="en-US" smtClean="0"/>
               <a:t>‹#›</a:t>
             </a:fld>
-            <a:endParaRPr lang="en-US"/>
+            <a:endParaRPr lang="en-US" dirty="0"/>
           </a:p>
         </p:txBody>
       </p:sp>
@@ -1784,7 +1784,7 @@
               <a:rPr lang="en-US" smtClean="0"/>
               <a:t>6/29/2016</a:t>
             </a:fld>
-            <a:endParaRPr lang="en-US"/>
+            <a:endParaRPr lang="en-US" dirty="0"/>
           </a:p>
         </p:txBody>
       </p:sp>
@@ -1803,7 +1803,7 @@
           <a:bodyPr/>
           <a:lstStyle/>
           <a:p>
-            <a:endParaRPr lang="en-US"/>
+            <a:endParaRPr lang="en-US" dirty="0"/>
           </a:p>
         </p:txBody>
       </p:sp>
@@ -1826,7 +1826,7 @@
               <a:rPr lang="en-US" smtClean="0"/>
               <a:t>‹#›</a:t>
             </a:fld>
-            <a:endParaRPr lang="en-US"/>
+            <a:endParaRPr lang="en-US" dirty="0"/>
           </a:p>
         </p:txBody>
       </p:sp>
@@ -1902,7 +1902,7 @@
               <a:rPr lang="en-US" smtClean="0"/>
               <a:t>6/29/2016</a:t>
             </a:fld>
-            <a:endParaRPr lang="en-US"/>
+            <a:endParaRPr lang="en-US" dirty="0"/>
           </a:p>
         </p:txBody>
       </p:sp>
@@ -1921,7 +1921,7 @@
           <a:bodyPr/>
           <a:lstStyle/>
           <a:p>
-            <a:endParaRPr lang="en-US"/>
+            <a:endParaRPr lang="en-US" dirty="0"/>
           </a:p>
         </p:txBody>
       </p:sp>
@@ -1944,7 +1944,7 @@
               <a:rPr lang="en-US" smtClean="0"/>
               <a:t>‹#›</a:t>
             </a:fld>
-            <a:endParaRPr lang="en-US"/>
+            <a:endParaRPr lang="en-US" dirty="0"/>
           </a:p>
         </p:txBody>
       </p:sp>
@@ -1997,7 +1997,7 @@
               <a:rPr lang="en-US" smtClean="0"/>
               <a:t>6/29/2016</a:t>
             </a:fld>
-            <a:endParaRPr lang="en-US"/>
+            <a:endParaRPr lang="en-US" dirty="0"/>
           </a:p>
         </p:txBody>
       </p:sp>
@@ -2016,7 +2016,7 @@
           <a:bodyPr/>
           <a:lstStyle/>
           <a:p>
-            <a:endParaRPr lang="en-US"/>
+            <a:endParaRPr lang="en-US" dirty="0"/>
           </a:p>
         </p:txBody>
       </p:sp>
@@ -2039,7 +2039,7 @@
               <a:rPr lang="en-US" smtClean="0"/>
               <a:t>‹#›</a:t>
             </a:fld>
-            <a:endParaRPr lang="en-US"/>
+            <a:endParaRPr lang="en-US" dirty="0"/>
           </a:p>
         </p:txBody>
       </p:sp>
@@ -2274,7 +2274,7 @@
               <a:rPr lang="en-US" smtClean="0"/>
               <a:t>6/29/2016</a:t>
             </a:fld>
-            <a:endParaRPr lang="en-US"/>
+            <a:endParaRPr lang="en-US" dirty="0"/>
           </a:p>
         </p:txBody>
       </p:sp>
@@ -2293,7 +2293,7 @@
           <a:bodyPr/>
           <a:lstStyle/>
           <a:p>
-            <a:endParaRPr lang="en-US"/>
+            <a:endParaRPr lang="en-US" dirty="0"/>
           </a:p>
         </p:txBody>
       </p:sp>
@@ -2316,7 +2316,7 @@
               <a:rPr lang="en-US" smtClean="0"/>
               <a:t>‹#›</a:t>
             </a:fld>
-            <a:endParaRPr lang="en-US"/>
+            <a:endParaRPr lang="en-US" dirty="0"/>
           </a:p>
         </p:txBody>
       </p:sp>
@@ -2439,7 +2439,7 @@
             </a:lvl9pPr>
           </a:lstStyle>
           <a:p>
-            <a:endParaRPr lang="en-US"/>
+            <a:endParaRPr lang="en-US" dirty="0"/>
           </a:p>
         </p:txBody>
       </p:sp>
@@ -2527,7 +2527,7 @@
               <a:rPr lang="en-US" smtClean="0"/>
               <a:t>6/29/2016</a:t>
             </a:fld>
-            <a:endParaRPr lang="en-US"/>
+            <a:endParaRPr lang="en-US" dirty="0"/>
           </a:p>
         </p:txBody>
       </p:sp>
@@ -2546,7 +2546,7 @@
           <a:bodyPr/>
           <a:lstStyle/>
           <a:p>
-            <a:endParaRPr lang="en-US"/>
+            <a:endParaRPr lang="en-US" dirty="0"/>
           </a:p>
         </p:txBody>
       </p:sp>
@@ -2569,7 +2569,7 @@
               <a:rPr lang="en-US" smtClean="0"/>
               <a:t>‹#›</a:t>
             </a:fld>
-            <a:endParaRPr lang="en-US"/>
+            <a:endParaRPr lang="en-US" dirty="0"/>
           </a:p>
         </p:txBody>
       </p:sp>
@@ -2740,7 +2740,7 @@
               <a:rPr lang="en-US" smtClean="0"/>
               <a:t>6/29/2016</a:t>
             </a:fld>
-            <a:endParaRPr lang="en-US"/>
+            <a:endParaRPr lang="en-US" dirty="0"/>
           </a:p>
         </p:txBody>
       </p:sp>
@@ -2777,7 +2777,7 @@
             </a:lvl1pPr>
           </a:lstStyle>
           <a:p>
-            <a:endParaRPr lang="en-US"/>
+            <a:endParaRPr lang="en-US" dirty="0"/>
           </a:p>
         </p:txBody>
       </p:sp>
@@ -2818,7 +2818,7 @@
               <a:rPr lang="en-US" smtClean="0"/>
               <a:t>‹#›</a:t>
             </a:fld>
-            <a:endParaRPr lang="en-US"/>
+            <a:endParaRPr lang="en-US" dirty="0"/>
           </a:p>
         </p:txBody>
       </p:sp>
@@ -3262,35 +3262,35 @@
                 <a:gridCol w="1221366">
                   <a:extLst>
                     <a:ext uri="{9D8B030D-6E8A-4147-A177-3AD203B41FA5}">
-                      <a16:colId xmlns="" xmlns:a16="http://schemas.microsoft.com/office/drawing/2014/main" val="20000"/>
+                      <a16:colId xmlns:a16="http://schemas.microsoft.com/office/drawing/2014/main" xmlns="" val="20000"/>
                     </a:ext>
                   </a:extLst>
                 </a:gridCol>
                 <a:gridCol w="1279527">
                   <a:extLst>
                     <a:ext uri="{9D8B030D-6E8A-4147-A177-3AD203B41FA5}">
-                      <a16:colId xmlns="" xmlns:a16="http://schemas.microsoft.com/office/drawing/2014/main" val="20001"/>
+                      <a16:colId xmlns:a16="http://schemas.microsoft.com/office/drawing/2014/main" xmlns="" val="20001"/>
                     </a:ext>
                   </a:extLst>
                 </a:gridCol>
                 <a:gridCol w="1279527">
                   <a:extLst>
                     <a:ext uri="{9D8B030D-6E8A-4147-A177-3AD203B41FA5}">
-                      <a16:colId xmlns="" xmlns:a16="http://schemas.microsoft.com/office/drawing/2014/main" val="20002"/>
+                      <a16:colId xmlns:a16="http://schemas.microsoft.com/office/drawing/2014/main" xmlns="" val="20002"/>
                     </a:ext>
                   </a:extLst>
                 </a:gridCol>
                 <a:gridCol w="1046886">
                   <a:extLst>
                     <a:ext uri="{9D8B030D-6E8A-4147-A177-3AD203B41FA5}">
-                      <a16:colId xmlns="" xmlns:a16="http://schemas.microsoft.com/office/drawing/2014/main" val="20003"/>
+                      <a16:colId xmlns:a16="http://schemas.microsoft.com/office/drawing/2014/main" xmlns="" val="20003"/>
                     </a:ext>
                   </a:extLst>
                 </a:gridCol>
                 <a:gridCol w="1221366">
                   <a:extLst>
                     <a:ext uri="{9D8B030D-6E8A-4147-A177-3AD203B41FA5}">
-                      <a16:colId xmlns="" xmlns:a16="http://schemas.microsoft.com/office/drawing/2014/main" val="20004"/>
+                      <a16:colId xmlns:a16="http://schemas.microsoft.com/office/drawing/2014/main" xmlns="" val="20004"/>
                     </a:ext>
                   </a:extLst>
                 </a:gridCol>
@@ -3807,7 +3807,7 @@
                 </a:tc>
                 <a:extLst>
                   <a:ext uri="{0D108BD9-81ED-4DB2-BD59-A6C34878D82A}">
-                    <a16:rowId xmlns="" xmlns:a16="http://schemas.microsoft.com/office/drawing/2014/main" val="10000"/>
+                    <a16:rowId xmlns:a16="http://schemas.microsoft.com/office/drawing/2014/main" xmlns="" val="10000"/>
                   </a:ext>
                 </a:extLst>
               </a:tr>
@@ -3837,35 +3837,35 @@
                 <a:gridCol w="1287790">
                   <a:extLst>
                     <a:ext uri="{9D8B030D-6E8A-4147-A177-3AD203B41FA5}">
-                      <a16:colId xmlns="" xmlns:a16="http://schemas.microsoft.com/office/drawing/2014/main" val="20000"/>
+                      <a16:colId xmlns:a16="http://schemas.microsoft.com/office/drawing/2014/main" xmlns="" val="20000"/>
                     </a:ext>
                   </a:extLst>
                 </a:gridCol>
                 <a:gridCol w="1287790">
                   <a:extLst>
                     <a:ext uri="{9D8B030D-6E8A-4147-A177-3AD203B41FA5}">
-                      <a16:colId xmlns="" xmlns:a16="http://schemas.microsoft.com/office/drawing/2014/main" val="20001"/>
+                      <a16:colId xmlns:a16="http://schemas.microsoft.com/office/drawing/2014/main" xmlns="" val="20001"/>
                     </a:ext>
                   </a:extLst>
                 </a:gridCol>
                 <a:gridCol w="1229253">
                   <a:extLst>
                     <a:ext uri="{9D8B030D-6E8A-4147-A177-3AD203B41FA5}">
-                      <a16:colId xmlns="" xmlns:a16="http://schemas.microsoft.com/office/drawing/2014/main" val="20002"/>
+                      <a16:colId xmlns:a16="http://schemas.microsoft.com/office/drawing/2014/main" xmlns="" val="20002"/>
                     </a:ext>
                   </a:extLst>
                 </a:gridCol>
                 <a:gridCol w="1053619">
                   <a:extLst>
                     <a:ext uri="{9D8B030D-6E8A-4147-A177-3AD203B41FA5}">
-                      <a16:colId xmlns="" xmlns:a16="http://schemas.microsoft.com/office/drawing/2014/main" val="20003"/>
+                      <a16:colId xmlns:a16="http://schemas.microsoft.com/office/drawing/2014/main" xmlns="" val="20003"/>
                     </a:ext>
                   </a:extLst>
                 </a:gridCol>
                 <a:gridCol w="1190220">
                   <a:extLst>
                     <a:ext uri="{9D8B030D-6E8A-4147-A177-3AD203B41FA5}">
-                      <a16:colId xmlns="" xmlns:a16="http://schemas.microsoft.com/office/drawing/2014/main" val="20004"/>
+                      <a16:colId xmlns:a16="http://schemas.microsoft.com/office/drawing/2014/main" xmlns="" val="20004"/>
                     </a:ext>
                   </a:extLst>
                 </a:gridCol>
@@ -4189,7 +4189,7 @@
                 </a:tc>
                 <a:extLst>
                   <a:ext uri="{0D108BD9-81ED-4DB2-BD59-A6C34878D82A}">
-                    <a16:rowId xmlns="" xmlns:a16="http://schemas.microsoft.com/office/drawing/2014/main" val="10000"/>
+                    <a16:rowId xmlns:a16="http://schemas.microsoft.com/office/drawing/2014/main" xmlns="" val="10000"/>
                   </a:ext>
                 </a:extLst>
               </a:tr>
@@ -4972,7 +4972,7 @@
           <a:p>
             <a:pPr defTabSz="457200"/>
             <a:r>
-              <a:rPr lang="es-AR" sz="1000" b="1" dirty="0" err="1" smtClean="0">
+              <a:rPr lang="es-AR" sz="1000" b="1" dirty="0" smtClean="0">
                 <a:solidFill>
                   <a:srgbClr val="1F497D"/>
                 </a:solidFill>
@@ -4992,7 +4992,7 @@
               <a:t>. </a:t>
             </a:r>
             <a:r>
-              <a:rPr lang="es-AR" sz="1000" b="1" dirty="0" err="1" smtClean="0">
+              <a:rPr lang="es-AR" sz="1000" b="1" dirty="0" smtClean="0">
                 <a:solidFill>
                   <a:srgbClr val="1F497D"/>
                 </a:solidFill>
@@ -5035,7 +5035,7 @@
               <a:t>    P. </a:t>
             </a:r>
             <a:r>
-              <a:rPr lang="es-AR" sz="1000" b="1" dirty="0" err="1" smtClean="0">
+              <a:rPr lang="es-AR" sz="1000" b="1" dirty="0" smtClean="0">
                 <a:solidFill>
                   <a:srgbClr val="1F497D"/>
                 </a:solidFill>
@@ -5138,7 +5138,7 @@
           <a:lstStyle/>
           <a:p>
             <a:pPr defTabSz="457200"/>
-            <a:endParaRPr lang="en-US">
+            <a:endParaRPr lang="en-US" dirty="0">
               <a:solidFill>
                 <a:prstClr val="black"/>
               </a:solidFill>
@@ -5180,7 +5180,7 @@
           <a:lstStyle/>
           <a:p>
             <a:pPr defTabSz="457200"/>
-            <a:endParaRPr lang="en-US">
+            <a:endParaRPr lang="en-US" dirty="0">
               <a:solidFill>
                 <a:prstClr val="black"/>
               </a:solidFill>
@@ -5248,7 +5248,7 @@
             <a:lstStyle/>
             <a:p>
               <a:pPr algn="ctr" defTabSz="457200"/>
-              <a:endParaRPr lang="es-ES">
+              <a:endParaRPr lang="es-ES" dirty="0">
                 <a:solidFill>
                   <a:srgbClr val="FFFFFF"/>
                 </a:solidFill>
@@ -5382,7 +5382,7 @@
             <a:lstStyle/>
             <a:p>
               <a:pPr algn="ctr" defTabSz="457200"/>
-              <a:endParaRPr lang="es-ES">
+              <a:endParaRPr lang="es-ES" dirty="0">
                 <a:solidFill>
                   <a:srgbClr val="FFFFFF"/>
                 </a:solidFill>
@@ -5523,7 +5523,7 @@
             <a:lstStyle/>
             <a:p>
               <a:pPr algn="ctr" defTabSz="457200"/>
-              <a:endParaRPr lang="es-ES">
+              <a:endParaRPr lang="es-ES" dirty="0">
                 <a:solidFill>
                   <a:srgbClr val="FFFFFF"/>
                 </a:solidFill>
@@ -5664,7 +5664,7 @@
             <a:lstStyle/>
             <a:p>
               <a:pPr algn="ctr" defTabSz="457200"/>
-              <a:endParaRPr lang="es-ES">
+              <a:endParaRPr lang="es-ES" dirty="0">
                 <a:solidFill>
                   <a:srgbClr val="FFFFFF"/>
                 </a:solidFill>
@@ -5805,7 +5805,7 @@
             <a:lstStyle/>
             <a:p>
               <a:pPr algn="ctr" defTabSz="457200"/>
-              <a:endParaRPr lang="es-ES">
+              <a:endParaRPr lang="es-ES" dirty="0">
                 <a:solidFill>
                   <a:srgbClr val="FFFFFF"/>
                 </a:solidFill>
@@ -6196,7 +6196,7 @@
                 <a:spcPts val="0"/>
               </a:spcAft>
             </a:pPr>
-            <a:endParaRPr lang="en-US">
+            <a:endParaRPr lang="en-US" dirty="0">
               <a:solidFill>
                 <a:prstClr val="white"/>
               </a:solidFill>
@@ -6263,7 +6263,7 @@
             <a:lstStyle/>
             <a:p>
               <a:pPr algn="ctr" defTabSz="457200"/>
-              <a:endParaRPr lang="es-ES">
+              <a:endParaRPr lang="es-ES" dirty="0">
                 <a:solidFill>
                   <a:srgbClr val="FFFFFF"/>
                 </a:solidFill>
@@ -6386,7 +6386,7 @@
         <p:spPr>
           <a:xfrm>
             <a:off x="214313" y="3378802"/>
-            <a:ext cx="5293791" cy="1938992"/>
+            <a:ext cx="5293791" cy="1631216"/>
           </a:xfrm>
           <a:prstGeom prst="rect">
             <a:avLst/>
@@ -6410,7 +6410,35 @@
                 <a:latin typeface="Arial" panose="020B0604020202020204" pitchFamily="34" charset="0"/>
                 <a:cs typeface="Arial" panose="020B0604020202020204" pitchFamily="34" charset="0"/>
               </a:rPr>
-              <a:t>-    Aprobación de documento WBS (27-05-2016).</a:t>
+              <a:t>-    </a:t>
+            </a:r>
+            <a:r>
+              <a:rPr lang="es-AR" sz="1000" dirty="0" smtClean="0">
+                <a:latin typeface="Arial" panose="020B0604020202020204" pitchFamily="34" charset="0"/>
+                <a:cs typeface="Arial" panose="020B0604020202020204" pitchFamily="34" charset="0"/>
+              </a:rPr>
+              <a:t>Se aprobó documentación de </a:t>
+            </a:r>
+            <a:r>
+              <a:rPr lang="es-AR" sz="1000" dirty="0" smtClean="0">
+                <a:latin typeface="Arial" panose="020B0604020202020204" pitchFamily="34" charset="0"/>
+                <a:cs typeface="Arial" panose="020B0604020202020204" pitchFamily="34" charset="0"/>
+              </a:rPr>
+              <a:t>WBS </a:t>
+            </a:r>
+            <a:r>
+              <a:rPr lang="es-AR" sz="1000" dirty="0" smtClean="0">
+                <a:latin typeface="Arial" panose="020B0604020202020204" pitchFamily="34" charset="0"/>
+                <a:cs typeface="Arial" panose="020B0604020202020204" pitchFamily="34" charset="0"/>
+              </a:rPr>
+              <a:t>( Fecha fin: 27-05-2016</a:t>
+            </a:r>
+            <a:r>
+              <a:rPr lang="es-AR" sz="1000" dirty="0" smtClean="0">
+                <a:latin typeface="Arial" panose="020B0604020202020204" pitchFamily="34" charset="0"/>
+                <a:cs typeface="Arial" panose="020B0604020202020204" pitchFamily="34" charset="0"/>
+              </a:rPr>
+              <a:t>).</a:t>
             </a:r>
           </a:p>
           <a:p>
@@ -6429,57 +6457,54 @@
                 <a:latin typeface="Arial" panose="020B0604020202020204" pitchFamily="34" charset="0"/>
                 <a:cs typeface="Arial" panose="020B0604020202020204" pitchFamily="34" charset="0"/>
               </a:rPr>
-              <a:t>Aprobación de documentos </a:t>
+              <a:t>Se aprobaron </a:t>
             </a:r>
             <a:r>
               <a:rPr lang="es-AR" sz="1000" dirty="0" smtClean="0">
                 <a:latin typeface="Arial" panose="020B0604020202020204" pitchFamily="34" charset="0"/>
                 <a:cs typeface="Arial" panose="020B0604020202020204" pitchFamily="34" charset="0"/>
               </a:rPr>
-              <a:t>del proyecto. </a:t>
+              <a:t>documentos del proyecto. </a:t>
             </a:r>
             <a:r>
               <a:rPr lang="es-AR" sz="1000" dirty="0" smtClean="0">
                 <a:latin typeface="Arial" panose="020B0604020202020204" pitchFamily="34" charset="0"/>
                 <a:cs typeface="Arial" panose="020B0604020202020204" pitchFamily="34" charset="0"/>
               </a:rPr>
-              <a:t>(03-06-2016).</a:t>
-            </a:r>
+              <a:t>(Fecha fin: 03-06-2016).</a:t>
+            </a:r>
+          </a:p>
+          <a:p>
+            <a:endParaRPr lang="es-AR" sz="1000" dirty="0">
+              <a:latin typeface="Arial" panose="020B0604020202020204" pitchFamily="34" charset="0"/>
+              <a:cs typeface="Arial" panose="020B0604020202020204" pitchFamily="34" charset="0"/>
+            </a:endParaRPr>
           </a:p>
           <a:p>
             <a:pPr marL="171450" indent="-171450">
               <a:buFontTx/>
               <a:buChar char="-"/>
             </a:pPr>
-            <a:endParaRPr lang="es-AR" sz="1000" dirty="0">
-              <a:latin typeface="Arial" panose="020B0604020202020204" pitchFamily="34" charset="0"/>
-              <a:cs typeface="Arial" panose="020B0604020202020204" pitchFamily="34" charset="0"/>
-            </a:endParaRPr>
-          </a:p>
-          <a:p>
-            <a:pPr marL="171450" indent="-171450">
-              <a:buFontTx/>
-              <a:buChar char="-"/>
-            </a:pPr>
             <a:r>
               <a:rPr lang="es-AR" sz="1000" dirty="0" smtClean="0">
                 <a:latin typeface="Arial" panose="020B0604020202020204" pitchFamily="34" charset="0"/>
                 <a:cs typeface="Arial" panose="020B0604020202020204" pitchFamily="34" charset="0"/>
               </a:rPr>
-              <a:t>Especificación de Arquitectura (01-07-2016).</a:t>
-            </a:r>
-          </a:p>
-          <a:p>
-            <a:pPr marL="628650" lvl="1" indent="-171450">
-              <a:buFontTx/>
-              <a:buChar char="-"/>
-            </a:pPr>
+              <a:t>Especificación de Arquitectura </a:t>
+            </a:r>
             <a:r>
               <a:rPr lang="es-AR" sz="1000" dirty="0" smtClean="0">
                 <a:latin typeface="Arial" panose="020B0604020202020204" pitchFamily="34" charset="0"/>
                 <a:cs typeface="Arial" panose="020B0604020202020204" pitchFamily="34" charset="0"/>
               </a:rPr>
-              <a:t>Presentado, esperando aprobación.</a:t>
+              <a:t>(Fecha fin estimada: 01-07-2016</a:t>
+            </a:r>
+            <a:r>
+              <a:rPr lang="es-AR" sz="1000" dirty="0" smtClean="0">
+                <a:latin typeface="Arial" panose="020B0604020202020204" pitchFamily="34" charset="0"/>
+                <a:cs typeface="Arial" panose="020B0604020202020204" pitchFamily="34" charset="0"/>
+              </a:rPr>
+              <a:t>).</a:t>
             </a:r>
           </a:p>
           <a:p>
@@ -6502,21 +6527,19 @@
                 <a:latin typeface="Arial" panose="020B0604020202020204" pitchFamily="34" charset="0"/>
                 <a:cs typeface="Arial" panose="020B0604020202020204" pitchFamily="34" charset="0"/>
               </a:rPr>
-              <a:t>Casos de uso de negocio (01-07-2016).</a:t>
-            </a:r>
-          </a:p>
-          <a:p>
-            <a:pPr marL="628650" lvl="1" indent="-171450">
-              <a:buFontTx/>
-              <a:buChar char="-"/>
-            </a:pPr>
+              <a:t>Casos de uso de negocio </a:t>
+            </a:r>
             <a:r>
               <a:rPr lang="es-AR" sz="1000" dirty="0" smtClean="0">
                 <a:latin typeface="Arial" panose="020B0604020202020204" pitchFamily="34" charset="0"/>
                 <a:cs typeface="Arial" panose="020B0604020202020204" pitchFamily="34" charset="0"/>
               </a:rPr>
-              <a:t>Presentado, esperando aprobación. </a:t>
-            </a:r>
+              <a:t>(Fecha fin estimada: 01-07-2016).</a:t>
+            </a:r>
+            <a:endParaRPr lang="es-AR" sz="1000" dirty="0" smtClean="0">
+              <a:latin typeface="Arial" panose="020B0604020202020204" pitchFamily="34" charset="0"/>
+              <a:cs typeface="Arial" panose="020B0604020202020204" pitchFamily="34" charset="0"/>
+            </a:endParaRPr>
           </a:p>
           <a:p>
             <a:pPr marL="171450" indent="-171450">
@@ -6668,7 +6691,21 @@
                 <a:latin typeface="Arial" pitchFamily="34" charset="0"/>
                 <a:cs typeface="Arial" pitchFamily="34" charset="0"/>
               </a:rPr>
-              <a:t>Se  definió la tecnología a utilizar en la implementación.</a:t>
+              <a:t>Se  definió la tecnología </a:t>
+            </a:r>
+            <a:r>
+              <a:rPr lang="es-AR" sz="1000" dirty="0" smtClean="0">
+                <a:latin typeface="Arial" pitchFamily="34" charset="0"/>
+                <a:cs typeface="Arial" pitchFamily="34" charset="0"/>
+              </a:rPr>
+              <a:t>y arquitectura a </a:t>
+            </a:r>
+            <a:r>
+              <a:rPr lang="es-AR" sz="1000" dirty="0" smtClean="0">
+                <a:latin typeface="Arial" pitchFamily="34" charset="0"/>
+                <a:cs typeface="Arial" pitchFamily="34" charset="0"/>
+              </a:rPr>
+              <a:t>utilizar en la implementación.</a:t>
             </a:r>
           </a:p>
           <a:p>
@@ -6690,7 +6727,7 @@
               <a:t>Se acordó la estrategia de implementación  (Roll </a:t>
             </a:r>
             <a:r>
-              <a:rPr lang="es-AR" sz="1000" dirty="0" err="1" smtClean="0">
+              <a:rPr lang="es-AR" sz="1000" dirty="0" smtClean="0">
                 <a:latin typeface="Arial" pitchFamily="34" charset="0"/>
                 <a:cs typeface="Arial" pitchFamily="34" charset="0"/>
               </a:rPr>
@@ -6885,7 +6922,7 @@
         <p:spPr>
           <a:xfrm>
             <a:off x="5639420" y="1102230"/>
-            <a:ext cx="3205485" cy="1769715"/>
+            <a:ext cx="3205485" cy="1923604"/>
           </a:xfrm>
           <a:prstGeom prst="rect">
             <a:avLst/>
@@ -6907,50 +6944,56 @@
                 <a:latin typeface="Arial" panose="020B0604020202020204" pitchFamily="34" charset="0"/>
                 <a:cs typeface="Arial" panose="020B0604020202020204" pitchFamily="34" charset="0"/>
               </a:rPr>
-              <a:t>En el caso de que exista un recorte de </a:t>
+              <a:t>Riesgo: </a:t>
+            </a:r>
+            <a:r>
+              <a:rPr lang="es-AR" sz="1000" dirty="0" smtClean="0">
+                <a:latin typeface="Arial" panose="020B0604020202020204" pitchFamily="34" charset="0"/>
+                <a:cs typeface="Arial" panose="020B0604020202020204" pitchFamily="34" charset="0"/>
+              </a:rPr>
+              <a:t>Diferencias </a:t>
             </a:r>
             <a:r>
               <a:rPr lang="es-AR" sz="1000" dirty="0">
                 <a:latin typeface="Arial" panose="020B0604020202020204" pitchFamily="34" charset="0"/>
                 <a:cs typeface="Arial" panose="020B0604020202020204" pitchFamily="34" charset="0"/>
               </a:rPr>
-              <a:t>calendario, entonces el proyecto podría sufrir una reestructuración</a:t>
+              <a:t>de </a:t>
+            </a:r>
+            <a:r>
+              <a:rPr lang="es-AR" sz="1000" dirty="0" err="1" smtClean="0">
+                <a:latin typeface="Arial" panose="020B0604020202020204" pitchFamily="34" charset="0"/>
+                <a:cs typeface="Arial" panose="020B0604020202020204" pitchFamily="34" charset="0"/>
+              </a:rPr>
+              <a:t>currículas</a:t>
             </a:r>
             <a:r>
               <a:rPr lang="es-AR" sz="1000" dirty="0" smtClean="0">
                 <a:latin typeface="Arial" panose="020B0604020202020204" pitchFamily="34" charset="0"/>
                 <a:cs typeface="Arial" panose="020B0604020202020204" pitchFamily="34" charset="0"/>
               </a:rPr>
-              <a:t>. </a:t>
+              <a:t> </a:t>
             </a:r>
             <a:r>
               <a:rPr lang="es-AR" sz="1000" dirty="0">
-                <a:latin typeface="Arial" pitchFamily="34" charset="0"/>
-                <a:cs typeface="Arial" pitchFamily="34" charset="0"/>
+                <a:latin typeface="Arial" panose="020B0604020202020204" pitchFamily="34" charset="0"/>
+                <a:cs typeface="Arial" panose="020B0604020202020204" pitchFamily="34" charset="0"/>
               </a:rPr>
-              <a:t>(</a:t>
+              <a:t>entre </a:t>
             </a:r>
             <a:r>
               <a:rPr lang="es-AR" sz="1000" dirty="0" smtClean="0">
-                <a:latin typeface="Arial" pitchFamily="34" charset="0"/>
-                <a:cs typeface="Arial" pitchFamily="34" charset="0"/>
+                <a:latin typeface="Arial" panose="020B0604020202020204" pitchFamily="34" charset="0"/>
+                <a:cs typeface="Arial" panose="020B0604020202020204" pitchFamily="34" charset="0"/>
               </a:rPr>
-              <a:t>Impacto Medio. </a:t>
-            </a:r>
-            <a:r>
-              <a:rPr lang="es-AR" sz="1000" dirty="0">
-                <a:latin typeface="Arial" pitchFamily="34" charset="0"/>
-                <a:cs typeface="Arial" pitchFamily="34" charset="0"/>
-              </a:rPr>
-              <a:t>Probabilidad de </a:t>
-            </a:r>
-            <a:r>
-              <a:rPr lang="es-AR" sz="1000" dirty="0" smtClean="0">
-                <a:latin typeface="Arial" pitchFamily="34" charset="0"/>
-                <a:cs typeface="Arial" pitchFamily="34" charset="0"/>
-              </a:rPr>
-              <a:t>Ocurrencia Media)</a:t>
-            </a:r>
+              <a:t>Jurisdicciones.( Impacto medio, exposición media).</a:t>
+            </a:r>
+          </a:p>
+          <a:p>
+            <a:endParaRPr lang="es-AR" sz="1000" dirty="0" smtClean="0">
+              <a:latin typeface="Arial" panose="020B0604020202020204" pitchFamily="34" charset="0"/>
+              <a:cs typeface="Arial" panose="020B0604020202020204" pitchFamily="34" charset="0"/>
+            </a:endParaRPr>
           </a:p>
           <a:p>
             <a:pPr marL="171450" indent="-171450">
@@ -6958,80 +7001,65 @@
               <a:buChar char="-"/>
             </a:pPr>
             <a:r>
+              <a:rPr lang="es-AR" sz="1000" dirty="0" smtClean="0">
+                <a:latin typeface="Arial" panose="020B0604020202020204" pitchFamily="34" charset="0"/>
+                <a:cs typeface="Arial" panose="020B0604020202020204" pitchFamily="34" charset="0"/>
+              </a:rPr>
+              <a:t>Riesgo: Falta de disponibilidad de docente para la prueba piloto. (Impacto alto, exposición baja).</a:t>
+            </a:r>
+          </a:p>
+          <a:p>
+            <a:endParaRPr lang="es-AR" sz="1000" dirty="0" smtClean="0">
+              <a:latin typeface="Arial" panose="020B0604020202020204" pitchFamily="34" charset="0"/>
+              <a:cs typeface="Arial" panose="020B0604020202020204" pitchFamily="34" charset="0"/>
+            </a:endParaRPr>
+          </a:p>
+          <a:p>
+            <a:pPr marL="171450" indent="-171450">
+              <a:buFontTx/>
+              <a:buChar char="-"/>
+            </a:pPr>
+            <a:r>
               <a:rPr lang="es-AR" sz="1000" dirty="0">
                 <a:latin typeface="Arial" panose="020B0604020202020204" pitchFamily="34" charset="0"/>
                 <a:cs typeface="Arial" panose="020B0604020202020204" pitchFamily="34" charset="0"/>
               </a:rPr>
-              <a:t>Aparición de empresa con pretensiones de imitar el modelo de negocio</a:t>
+              <a:t>Riesgo: Falta de disponibilidad </a:t>
             </a:r>
             <a:r>
               <a:rPr lang="es-AR" sz="1000" dirty="0" smtClean="0">
                 <a:latin typeface="Arial" panose="020B0604020202020204" pitchFamily="34" charset="0"/>
                 <a:cs typeface="Arial" panose="020B0604020202020204" pitchFamily="34" charset="0"/>
               </a:rPr>
-              <a:t>. (</a:t>
-            </a:r>
-            <a:r>
-              <a:rPr lang="es-AR" sz="1000" dirty="0">
-                <a:latin typeface="Arial" pitchFamily="34" charset="0"/>
-                <a:cs typeface="Arial" pitchFamily="34" charset="0"/>
-              </a:rPr>
-              <a:t>Impacto Medio. Probabilidad de Ocurrencia </a:t>
-            </a:r>
-            <a:r>
-              <a:rPr lang="es-AR" sz="1000" dirty="0" smtClean="0">
-                <a:latin typeface="Arial" pitchFamily="34" charset="0"/>
-                <a:cs typeface="Arial" pitchFamily="34" charset="0"/>
-              </a:rPr>
-              <a:t>Baja)</a:t>
-            </a:r>
-          </a:p>
-          <a:p>
-            <a:pPr marL="171450" indent="-171450">
-              <a:buFontTx/>
-              <a:buChar char="-"/>
-            </a:pPr>
+              <a:t>del </a:t>
+            </a:r>
             <a:r>
               <a:rPr lang="es-AR" sz="1000" dirty="0">
                 <a:latin typeface="Arial" panose="020B0604020202020204" pitchFamily="34" charset="0"/>
                 <a:cs typeface="Arial" panose="020B0604020202020204" pitchFamily="34" charset="0"/>
               </a:rPr>
-              <a:t>Falta de Experiencia de programadores </a:t>
+              <a:t>docente para </a:t>
             </a:r>
             <a:r>
               <a:rPr lang="es-AR" sz="1000" dirty="0" smtClean="0">
                 <a:latin typeface="Arial" panose="020B0604020202020204" pitchFamily="34" charset="0"/>
                 <a:cs typeface="Arial" panose="020B0604020202020204" pitchFamily="34" charset="0"/>
               </a:rPr>
-              <a:t>PHP. </a:t>
+              <a:t>el armado del contenido. </a:t>
             </a:r>
             <a:r>
               <a:rPr lang="es-AR" sz="1000" dirty="0">
                 <a:latin typeface="Arial" panose="020B0604020202020204" pitchFamily="34" charset="0"/>
                 <a:cs typeface="Arial" panose="020B0604020202020204" pitchFamily="34" charset="0"/>
               </a:rPr>
-              <a:t>(Impacto </a:t>
+              <a:t>(Impacto alto, exposición </a:t>
             </a:r>
             <a:r>
               <a:rPr lang="es-AR" sz="1000" dirty="0" smtClean="0">
                 <a:latin typeface="Arial" panose="020B0604020202020204" pitchFamily="34" charset="0"/>
                 <a:cs typeface="Arial" panose="020B0604020202020204" pitchFamily="34" charset="0"/>
               </a:rPr>
-              <a:t>Alto. </a:t>
-            </a:r>
-            <a:r>
-              <a:rPr lang="es-AR" sz="1000" dirty="0">
-                <a:latin typeface="Arial" panose="020B0604020202020204" pitchFamily="34" charset="0"/>
-                <a:cs typeface="Arial" panose="020B0604020202020204" pitchFamily="34" charset="0"/>
-              </a:rPr>
-              <a:t>Probabilidad de Ocurrencia </a:t>
-            </a:r>
-            <a:r>
-              <a:rPr lang="es-AR" sz="1000" dirty="0" smtClean="0">
-                <a:latin typeface="Arial" panose="020B0604020202020204" pitchFamily="34" charset="0"/>
-                <a:cs typeface="Arial" panose="020B0604020202020204" pitchFamily="34" charset="0"/>
-              </a:rPr>
-              <a:t>Media)</a:t>
+              <a:t>media).</a:t>
             </a:r>
             <a:endParaRPr lang="es-AR" sz="1000" dirty="0">
               <a:latin typeface="Arial" panose="020B0604020202020204" pitchFamily="34" charset="0"/>

</xml_diff>